<commit_message>
add log out and namelist
</commit_message>
<xml_diff>
--- a/ChattingRoom.pptx
+++ b/ChattingRoom.pptx
@@ -290,7 +290,7 @@
           <a:p>
             <a:fld id="{E270F6BC-33A3-644F-9405-8F29D1077F88}" type="datetimeFigureOut">
               <a:rPr kumimoji="1" lang="zh-CN" altLang="en-US" smtClean="0"/>
-              <a:t>7/30/15</a:t>
+              <a:t>8/19/15</a:t>
             </a:fld>
             <a:endParaRPr kumimoji="1" lang="zh-CN" altLang="en-US"/>
           </a:p>
@@ -460,7 +460,7 @@
           <a:p>
             <a:fld id="{E270F6BC-33A3-644F-9405-8F29D1077F88}" type="datetimeFigureOut">
               <a:rPr kumimoji="1" lang="zh-CN" altLang="en-US" smtClean="0"/>
-              <a:t>7/30/15</a:t>
+              <a:t>8/19/15</a:t>
             </a:fld>
             <a:endParaRPr kumimoji="1" lang="zh-CN" altLang="en-US"/>
           </a:p>
@@ -640,7 +640,7 @@
           <a:p>
             <a:fld id="{E270F6BC-33A3-644F-9405-8F29D1077F88}" type="datetimeFigureOut">
               <a:rPr kumimoji="1" lang="zh-CN" altLang="en-US" smtClean="0"/>
-              <a:t>7/30/15</a:t>
+              <a:t>8/19/15</a:t>
             </a:fld>
             <a:endParaRPr kumimoji="1" lang="zh-CN" altLang="en-US"/>
           </a:p>
@@ -810,7 +810,7 @@
           <a:p>
             <a:fld id="{E270F6BC-33A3-644F-9405-8F29D1077F88}" type="datetimeFigureOut">
               <a:rPr kumimoji="1" lang="zh-CN" altLang="en-US" smtClean="0"/>
-              <a:t>7/30/15</a:t>
+              <a:t>8/19/15</a:t>
             </a:fld>
             <a:endParaRPr kumimoji="1" lang="zh-CN" altLang="en-US"/>
           </a:p>
@@ -1056,7 +1056,7 @@
           <a:p>
             <a:fld id="{E270F6BC-33A3-644F-9405-8F29D1077F88}" type="datetimeFigureOut">
               <a:rPr kumimoji="1" lang="zh-CN" altLang="en-US" smtClean="0"/>
-              <a:t>7/30/15</a:t>
+              <a:t>8/19/15</a:t>
             </a:fld>
             <a:endParaRPr kumimoji="1" lang="zh-CN" altLang="en-US"/>
           </a:p>
@@ -1344,7 +1344,7 @@
           <a:p>
             <a:fld id="{E270F6BC-33A3-644F-9405-8F29D1077F88}" type="datetimeFigureOut">
               <a:rPr kumimoji="1" lang="zh-CN" altLang="en-US" smtClean="0"/>
-              <a:t>7/30/15</a:t>
+              <a:t>8/19/15</a:t>
             </a:fld>
             <a:endParaRPr kumimoji="1" lang="zh-CN" altLang="en-US"/>
           </a:p>
@@ -1766,7 +1766,7 @@
           <a:p>
             <a:fld id="{E270F6BC-33A3-644F-9405-8F29D1077F88}" type="datetimeFigureOut">
               <a:rPr kumimoji="1" lang="zh-CN" altLang="en-US" smtClean="0"/>
-              <a:t>7/30/15</a:t>
+              <a:t>8/19/15</a:t>
             </a:fld>
             <a:endParaRPr kumimoji="1" lang="zh-CN" altLang="en-US"/>
           </a:p>
@@ -1884,7 +1884,7 @@
           <a:p>
             <a:fld id="{E270F6BC-33A3-644F-9405-8F29D1077F88}" type="datetimeFigureOut">
               <a:rPr kumimoji="1" lang="zh-CN" altLang="en-US" smtClean="0"/>
-              <a:t>7/30/15</a:t>
+              <a:t>8/19/15</a:t>
             </a:fld>
             <a:endParaRPr kumimoji="1" lang="zh-CN" altLang="en-US"/>
           </a:p>
@@ -1979,7 +1979,7 @@
           <a:p>
             <a:fld id="{E270F6BC-33A3-644F-9405-8F29D1077F88}" type="datetimeFigureOut">
               <a:rPr kumimoji="1" lang="zh-CN" altLang="en-US" smtClean="0"/>
-              <a:t>7/30/15</a:t>
+              <a:t>8/19/15</a:t>
             </a:fld>
             <a:endParaRPr kumimoji="1" lang="zh-CN" altLang="en-US"/>
           </a:p>
@@ -2256,7 +2256,7 @@
           <a:p>
             <a:fld id="{E270F6BC-33A3-644F-9405-8F29D1077F88}" type="datetimeFigureOut">
               <a:rPr kumimoji="1" lang="zh-CN" altLang="en-US" smtClean="0"/>
-              <a:t>7/30/15</a:t>
+              <a:t>8/19/15</a:t>
             </a:fld>
             <a:endParaRPr kumimoji="1" lang="zh-CN" altLang="en-US"/>
           </a:p>
@@ -2509,7 +2509,7 @@
           <a:p>
             <a:fld id="{E270F6BC-33A3-644F-9405-8F29D1077F88}" type="datetimeFigureOut">
               <a:rPr kumimoji="1" lang="zh-CN" altLang="en-US" smtClean="0"/>
-              <a:t>7/30/15</a:t>
+              <a:t>8/19/15</a:t>
             </a:fld>
             <a:endParaRPr kumimoji="1" lang="zh-CN" altLang="en-US"/>
           </a:p>
@@ -2722,7 +2722,7 @@
           <a:p>
             <a:fld id="{E270F6BC-33A3-644F-9405-8F29D1077F88}" type="datetimeFigureOut">
               <a:rPr kumimoji="1" lang="zh-CN" altLang="en-US" smtClean="0"/>
-              <a:t>7/30/15</a:t>
+              <a:t>8/19/15</a:t>
             </a:fld>
             <a:endParaRPr kumimoji="1" lang="zh-CN" altLang="en-US"/>
           </a:p>
@@ -4375,30 +4375,39 @@
               <a:rPr kumimoji="1" lang="en-US" altLang="zh-CN" dirty="0">
                 <a:hlinkClick r:id="rId2"/>
               </a:rPr>
-              <a:t>http://www.sitepoint.com/build-node-js-powered-chatroom-web-app-node-mongodb</a:t>
-            </a:r>
-            <a:r>
-              <a:rPr kumimoji="1" lang="en-US" altLang="zh-CN">
-                <a:hlinkClick r:id="rId2"/>
-              </a:rPr>
-              <a:t>-</a:t>
-            </a:r>
-            <a:r>
-              <a:rPr kumimoji="1" lang="en-US" altLang="zh-CN">
-                <a:hlinkClick r:id="rId2"/>
-              </a:rPr>
-              <a:t>socket</a:t>
-            </a:r>
-            <a:r>
-              <a:rPr kumimoji="1" lang="en-US" altLang="zh-CN" smtClean="0">
+              <a:t>http://www.sitepoint.com/build-node-js-powered-chatroom-web-app-node-mongodb-socket</a:t>
+            </a:r>
+            <a:r>
+              <a:rPr kumimoji="1" lang="en-US" altLang="zh-CN" dirty="0" smtClean="0">
                 <a:hlinkClick r:id="rId2"/>
               </a:rPr>
               <a:t>/</a:t>
             </a:r>
+            <a:endParaRPr kumimoji="1" lang="en-US" altLang="zh-CN" dirty="0" smtClean="0"/>
+          </a:p>
+          <a:p>
+            <a:endParaRPr kumimoji="1" lang="en-US" altLang="zh-CN" dirty="0"/>
+          </a:p>
+          <a:p>
+            <a:r>
+              <a:rPr kumimoji="1" lang="en-US" altLang="zh-CN" dirty="0">
+                <a:hlinkClick r:id="rId3"/>
+              </a:rPr>
+              <a:t>http://www.chatib.com</a:t>
+            </a:r>
+            <a:r>
+              <a:rPr kumimoji="1" lang="en-US" altLang="zh-CN" smtClean="0">
+                <a:hlinkClick r:id="rId3"/>
+              </a:rPr>
+              <a:t>/</a:t>
+            </a:r>
             <a:endParaRPr kumimoji="1" lang="en-US" altLang="zh-CN" smtClean="0"/>
           </a:p>
           <a:p>
-            <a:endParaRPr kumimoji="1" lang="zh-CN" altLang="en-US"/>
+            <a:endParaRPr kumimoji="1" lang="en-US" altLang="zh-CN" smtClean="0"/>
+          </a:p>
+          <a:p>
+            <a:endParaRPr kumimoji="1" lang="zh-CN" altLang="en-US" dirty="0"/>
           </a:p>
         </p:txBody>
       </p:sp>

</xml_diff>